<commit_message>
:pencil: Work on introduction and overview of R packages
</commit_message>
<xml_diff>
--- a/Workflow.pptx
+++ b/Workflow.pptx
@@ -6,6 +6,7 @@
   </p:sldMasterIdLst>
   <p:sldIdLst>
     <p:sldId id="257" r:id="rId2"/>
+    <p:sldId id="258" r:id="rId3"/>
   </p:sldIdLst>
   <p:sldSz cx="12192000" cy="6858000"/>
   <p:notesSz cx="6858000" cy="9144000"/>
@@ -5332,6 +5333,2350 @@
 </p:sld>
 </file>
 
+<file path=ppt/slides/slide2.xml><?xml version="1.0" encoding="utf-8"?>
+<p:sld xmlns:a="http://schemas.openxmlformats.org/drawingml/2006/main" xmlns:r="http://schemas.openxmlformats.org/officeDocument/2006/relationships" xmlns:p="http://schemas.openxmlformats.org/presentationml/2006/main">
+  <p:cSld>
+    <p:spTree>
+      <p:nvGrpSpPr>
+        <p:cNvPr id="1" name=""/>
+        <p:cNvGrpSpPr/>
+        <p:nvPr/>
+      </p:nvGrpSpPr>
+      <p:grpSpPr>
+        <a:xfrm>
+          <a:off x="0" y="0"/>
+          <a:ext cx="0" cy="0"/>
+          <a:chOff x="0" y="0"/>
+          <a:chExt cx="0" cy="0"/>
+        </a:xfrm>
+      </p:grpSpPr>
+      <p:cxnSp>
+        <p:nvCxnSpPr>
+          <p:cNvPr id="68" name="Straight Connector 67">
+            <a:extLst>
+              <a:ext uri="{FF2B5EF4-FFF2-40B4-BE49-F238E27FC236}">
+                <a16:creationId xmlns:a16="http://schemas.microsoft.com/office/drawing/2014/main" id="{B0BA1D8A-E8FD-2A42-888E-DACE5A54170B}"/>
+              </a:ext>
+            </a:extLst>
+          </p:cNvPr>
+          <p:cNvCxnSpPr>
+            <a:cxnSpLocks/>
+            <a:stCxn id="2" idx="2"/>
+            <a:endCxn id="7" idx="0"/>
+          </p:cNvCxnSpPr>
+          <p:nvPr/>
+        </p:nvCxnSpPr>
+        <p:spPr>
+          <a:xfrm>
+            <a:off x="875376" y="2061030"/>
+            <a:ext cx="0" cy="179025"/>
+          </a:xfrm>
+          <a:prstGeom prst="line">
+            <a:avLst/>
+          </a:prstGeom>
+          <a:ln w="38100">
+            <a:solidFill>
+              <a:schemeClr val="tx1"/>
+            </a:solidFill>
+          </a:ln>
+        </p:spPr>
+        <p:style>
+          <a:lnRef idx="1">
+            <a:schemeClr val="accent1"/>
+          </a:lnRef>
+          <a:fillRef idx="0">
+            <a:schemeClr val="accent1"/>
+          </a:fillRef>
+          <a:effectRef idx="0">
+            <a:schemeClr val="accent1"/>
+          </a:effectRef>
+          <a:fontRef idx="minor">
+            <a:schemeClr val="tx1"/>
+          </a:fontRef>
+        </p:style>
+      </p:cxnSp>
+      <p:sp>
+        <p:nvSpPr>
+          <p:cNvPr id="2" name="TextBox 1">
+            <a:extLst>
+              <a:ext uri="{FF2B5EF4-FFF2-40B4-BE49-F238E27FC236}">
+                <a16:creationId xmlns:a16="http://schemas.microsoft.com/office/drawing/2014/main" id="{CFEA73F3-6B20-9F43-B3E1-7DA7573E600D}"/>
+              </a:ext>
+            </a:extLst>
+          </p:cNvPr>
+          <p:cNvSpPr txBox="1"/>
+          <p:nvPr/>
+        </p:nvSpPr>
+        <p:spPr>
+          <a:xfrm>
+            <a:off x="254376" y="1537810"/>
+            <a:ext cx="1242000" cy="523220"/>
+          </a:xfrm>
+          <a:prstGeom prst="rect">
+            <a:avLst/>
+          </a:prstGeom>
+          <a:noFill/>
+          <a:ln>
+            <a:solidFill>
+              <a:schemeClr val="tx1"/>
+            </a:solidFill>
+          </a:ln>
+        </p:spPr>
+        <p:txBody>
+          <a:bodyPr wrap="square" rtlCol="0">
+            <a:spAutoFit/>
+          </a:bodyPr>
+          <a:lstStyle/>
+          <a:p>
+            <a:pPr algn="ctr"/>
+            <a:r>
+              <a:rPr lang="en-GB" sz="1400" dirty="0">
+                <a:latin typeface="Futura Medium" panose="020B0602020204020303" pitchFamily="34" charset="-79"/>
+                <a:cs typeface="Futura Medium" panose="020B0602020204020303" pitchFamily="34" charset="-79"/>
+              </a:rPr>
+              <a:t>Import spatial data</a:t>
+            </a:r>
+          </a:p>
+        </p:txBody>
+      </p:sp>
+      <p:sp>
+        <p:nvSpPr>
+          <p:cNvPr id="3" name="TextBox 2">
+            <a:extLst>
+              <a:ext uri="{FF2B5EF4-FFF2-40B4-BE49-F238E27FC236}">
+                <a16:creationId xmlns:a16="http://schemas.microsoft.com/office/drawing/2014/main" id="{846AA0A6-3D15-B044-9982-C60DA7900614}"/>
+              </a:ext>
+            </a:extLst>
+          </p:cNvPr>
+          <p:cNvSpPr txBox="1"/>
+          <p:nvPr/>
+        </p:nvSpPr>
+        <p:spPr>
+          <a:xfrm>
+            <a:off x="254376" y="2523709"/>
+            <a:ext cx="1242000" cy="400110"/>
+          </a:xfrm>
+          <a:prstGeom prst="rect">
+            <a:avLst/>
+          </a:prstGeom>
+          <a:noFill/>
+          <a:ln>
+            <a:solidFill>
+              <a:schemeClr val="tx1"/>
+            </a:solidFill>
+          </a:ln>
+        </p:spPr>
+        <p:txBody>
+          <a:bodyPr wrap="square" rtlCol="0">
+            <a:spAutoFit/>
+          </a:bodyPr>
+          <a:lstStyle/>
+          <a:p>
+            <a:pPr algn="ctr"/>
+            <a:r>
+              <a:rPr lang="en-GB" sz="1000" dirty="0">
+                <a:latin typeface="Courier" pitchFamily="2" charset="0"/>
+                <a:cs typeface="Futura Medium" panose="020B0602020204020303" pitchFamily="34" charset="-79"/>
+              </a:rPr>
+              <a:t>raster</a:t>
+            </a:r>
+          </a:p>
+          <a:p>
+            <a:pPr algn="ctr"/>
+            <a:r>
+              <a:rPr lang="en-GB" sz="1000" dirty="0">
+                <a:latin typeface="Courier" pitchFamily="2" charset="0"/>
+                <a:cs typeface="Futura Medium" panose="020B0602020204020303" pitchFamily="34" charset="-79"/>
+              </a:rPr>
+              <a:t>stars</a:t>
+            </a:r>
+          </a:p>
+        </p:txBody>
+      </p:sp>
+      <p:pic>
+        <p:nvPicPr>
+          <p:cNvPr id="4" name="Graphic 3" descr="Database">
+            <a:extLst>
+              <a:ext uri="{FF2B5EF4-FFF2-40B4-BE49-F238E27FC236}">
+                <a16:creationId xmlns:a16="http://schemas.microsoft.com/office/drawing/2014/main" id="{A9092ACA-486B-3B48-B15A-861BDCE2F1C6}"/>
+              </a:ext>
+            </a:extLst>
+          </p:cNvPr>
+          <p:cNvPicPr>
+            <a:picLocks noChangeAspect="1"/>
+          </p:cNvPicPr>
+          <p:nvPr/>
+        </p:nvPicPr>
+        <p:blipFill>
+          <a:blip r:embed="rId2">
+            <a:extLst>
+              <a:ext uri="{96DAC541-7B7A-43D3-8B79-37D633B846F1}">
+                <asvg:svgBlip xmlns:asvg="http://schemas.microsoft.com/office/drawing/2016/SVG/main" r:embed="rId3"/>
+              </a:ext>
+            </a:extLst>
+          </a:blip>
+          <a:stretch>
+            <a:fillRect/>
+          </a:stretch>
+        </p:blipFill>
+        <p:spPr>
+          <a:xfrm>
+            <a:off x="569716" y="982421"/>
+            <a:ext cx="540000" cy="540000"/>
+          </a:xfrm>
+          <a:prstGeom prst="rect">
+            <a:avLst/>
+          </a:prstGeom>
+        </p:spPr>
+      </p:pic>
+      <p:sp>
+        <p:nvSpPr>
+          <p:cNvPr id="5" name="TextBox 4">
+            <a:extLst>
+              <a:ext uri="{FF2B5EF4-FFF2-40B4-BE49-F238E27FC236}">
+                <a16:creationId xmlns:a16="http://schemas.microsoft.com/office/drawing/2014/main" id="{02594D6C-1624-EA4B-A378-9D3A906D0FA3}"/>
+              </a:ext>
+            </a:extLst>
+          </p:cNvPr>
+          <p:cNvSpPr txBox="1"/>
+          <p:nvPr/>
+        </p:nvSpPr>
+        <p:spPr>
+          <a:xfrm>
+            <a:off x="1766048" y="1563208"/>
+            <a:ext cx="1242000" cy="523220"/>
+          </a:xfrm>
+          <a:prstGeom prst="rect">
+            <a:avLst/>
+          </a:prstGeom>
+          <a:noFill/>
+          <a:ln>
+            <a:solidFill>
+              <a:schemeClr val="tx1"/>
+            </a:solidFill>
+          </a:ln>
+        </p:spPr>
+        <p:txBody>
+          <a:bodyPr wrap="square" rtlCol="0">
+            <a:spAutoFit/>
+          </a:bodyPr>
+          <a:lstStyle/>
+          <a:p>
+            <a:pPr algn="ctr"/>
+            <a:r>
+              <a:rPr lang="en-GB" sz="1400" dirty="0">
+                <a:latin typeface="Futura Medium" panose="020B0602020204020303" pitchFamily="34" charset="-79"/>
+                <a:cs typeface="Futura Medium" panose="020B0602020204020303" pitchFamily="34" charset="-79"/>
+              </a:rPr>
+              <a:t>Pre-process spatial data</a:t>
+            </a:r>
+          </a:p>
+        </p:txBody>
+      </p:sp>
+      <p:sp>
+        <p:nvSpPr>
+          <p:cNvPr id="6" name="TextBox 5">
+            <a:extLst>
+              <a:ext uri="{FF2B5EF4-FFF2-40B4-BE49-F238E27FC236}">
+                <a16:creationId xmlns:a16="http://schemas.microsoft.com/office/drawing/2014/main" id="{32A407CF-3AFE-BE4B-8A66-41196F089702}"/>
+              </a:ext>
+            </a:extLst>
+          </p:cNvPr>
+          <p:cNvSpPr txBox="1"/>
+          <p:nvPr/>
+        </p:nvSpPr>
+        <p:spPr>
+          <a:xfrm>
+            <a:off x="5300065" y="1563208"/>
+            <a:ext cx="1566000" cy="523220"/>
+          </a:xfrm>
+          <a:prstGeom prst="rect">
+            <a:avLst/>
+          </a:prstGeom>
+          <a:noFill/>
+          <a:ln>
+            <a:solidFill>
+              <a:schemeClr val="tx1"/>
+            </a:solidFill>
+          </a:ln>
+        </p:spPr>
+        <p:txBody>
+          <a:bodyPr wrap="square" rtlCol="0">
+            <a:spAutoFit/>
+          </a:bodyPr>
+          <a:lstStyle/>
+          <a:p>
+            <a:pPr algn="ctr"/>
+            <a:r>
+              <a:rPr lang="en-GB" sz="1400" dirty="0">
+                <a:latin typeface="Futura Medium" panose="020B0602020204020303" pitchFamily="34" charset="-79"/>
+                <a:cs typeface="Futura Medium" panose="020B0602020204020303" pitchFamily="34" charset="-79"/>
+              </a:rPr>
+              <a:t>Comparison with null hypothesis</a:t>
+            </a:r>
+          </a:p>
+        </p:txBody>
+      </p:sp>
+      <p:sp>
+        <p:nvSpPr>
+          <p:cNvPr id="7" name="TextBox 6">
+            <a:extLst>
+              <a:ext uri="{FF2B5EF4-FFF2-40B4-BE49-F238E27FC236}">
+                <a16:creationId xmlns:a16="http://schemas.microsoft.com/office/drawing/2014/main" id="{6A368B40-B7AB-6845-AF1F-CFBBF96B4B24}"/>
+              </a:ext>
+            </a:extLst>
+          </p:cNvPr>
+          <p:cNvSpPr txBox="1"/>
+          <p:nvPr/>
+        </p:nvSpPr>
+        <p:spPr>
+          <a:xfrm>
+            <a:off x="254376" y="2240055"/>
+            <a:ext cx="1242000" cy="276999"/>
+          </a:xfrm>
+          <a:prstGeom prst="rect">
+            <a:avLst/>
+          </a:prstGeom>
+          <a:noFill/>
+          <a:ln>
+            <a:solidFill>
+              <a:schemeClr val="tx1"/>
+            </a:solidFill>
+          </a:ln>
+        </p:spPr>
+        <p:txBody>
+          <a:bodyPr wrap="square" rtlCol="0">
+            <a:spAutoFit/>
+          </a:bodyPr>
+          <a:lstStyle/>
+          <a:p>
+            <a:r>
+              <a:rPr lang="en-GB" sz="1200" dirty="0">
+                <a:latin typeface="Futura Medium" panose="020B0602020204020303" pitchFamily="34" charset="-79"/>
+                <a:cs typeface="Futura Medium" panose="020B0602020204020303" pitchFamily="34" charset="-79"/>
+              </a:rPr>
+              <a:t>Raster data</a:t>
+            </a:r>
+          </a:p>
+        </p:txBody>
+      </p:sp>
+      <p:sp>
+        <p:nvSpPr>
+          <p:cNvPr id="8" name="TextBox 7">
+            <a:extLst>
+              <a:ext uri="{FF2B5EF4-FFF2-40B4-BE49-F238E27FC236}">
+                <a16:creationId xmlns:a16="http://schemas.microsoft.com/office/drawing/2014/main" id="{F8DAC329-1763-8749-AA3A-948027D5EC1F}"/>
+              </a:ext>
+            </a:extLst>
+          </p:cNvPr>
+          <p:cNvSpPr txBox="1"/>
+          <p:nvPr/>
+        </p:nvSpPr>
+        <p:spPr>
+          <a:xfrm>
+            <a:off x="256780" y="3316291"/>
+            <a:ext cx="1242000" cy="400110"/>
+          </a:xfrm>
+          <a:prstGeom prst="rect">
+            <a:avLst/>
+          </a:prstGeom>
+          <a:noFill/>
+          <a:ln>
+            <a:solidFill>
+              <a:schemeClr val="tx1"/>
+            </a:solidFill>
+          </a:ln>
+        </p:spPr>
+        <p:txBody>
+          <a:bodyPr wrap="square" rtlCol="0">
+            <a:spAutoFit/>
+          </a:bodyPr>
+          <a:lstStyle/>
+          <a:p>
+            <a:pPr algn="ctr"/>
+            <a:r>
+              <a:rPr lang="en-GB" sz="1000" dirty="0" err="1">
+                <a:latin typeface="Courier" pitchFamily="2" charset="0"/>
+                <a:cs typeface="Futura Medium" panose="020B0602020204020303" pitchFamily="34" charset="-79"/>
+              </a:rPr>
+              <a:t>sp</a:t>
+            </a:r>
+            <a:endParaRPr lang="en-GB" sz="1000" dirty="0">
+              <a:latin typeface="Courier" pitchFamily="2" charset="0"/>
+              <a:cs typeface="Futura Medium" panose="020B0602020204020303" pitchFamily="34" charset="-79"/>
+            </a:endParaRPr>
+          </a:p>
+          <a:p>
+            <a:pPr algn="ctr"/>
+            <a:r>
+              <a:rPr lang="en-GB" sz="1000" dirty="0">
+                <a:latin typeface="Courier" pitchFamily="2" charset="0"/>
+                <a:cs typeface="Futura Medium" panose="020B0602020204020303" pitchFamily="34" charset="-79"/>
+              </a:rPr>
+              <a:t>sf</a:t>
+            </a:r>
+          </a:p>
+        </p:txBody>
+      </p:sp>
+      <p:sp>
+        <p:nvSpPr>
+          <p:cNvPr id="9" name="TextBox 8">
+            <a:extLst>
+              <a:ext uri="{FF2B5EF4-FFF2-40B4-BE49-F238E27FC236}">
+                <a16:creationId xmlns:a16="http://schemas.microsoft.com/office/drawing/2014/main" id="{E0E35A45-A8A9-D440-928E-F519521C22CC}"/>
+              </a:ext>
+            </a:extLst>
+          </p:cNvPr>
+          <p:cNvSpPr txBox="1"/>
+          <p:nvPr/>
+        </p:nvSpPr>
+        <p:spPr>
+          <a:xfrm>
+            <a:off x="254376" y="3039292"/>
+            <a:ext cx="1242000" cy="276999"/>
+          </a:xfrm>
+          <a:prstGeom prst="rect">
+            <a:avLst/>
+          </a:prstGeom>
+          <a:noFill/>
+          <a:ln>
+            <a:solidFill>
+              <a:schemeClr val="tx1"/>
+            </a:solidFill>
+          </a:ln>
+        </p:spPr>
+        <p:txBody>
+          <a:bodyPr wrap="square" rtlCol="0">
+            <a:spAutoFit/>
+          </a:bodyPr>
+          <a:lstStyle/>
+          <a:p>
+            <a:r>
+              <a:rPr lang="en-GB" sz="1200" dirty="0">
+                <a:latin typeface="Futura Medium" panose="020B0602020204020303" pitchFamily="34" charset="-79"/>
+                <a:cs typeface="Futura Medium" panose="020B0602020204020303" pitchFamily="34" charset="-79"/>
+              </a:rPr>
+              <a:t>Vector data</a:t>
+            </a:r>
+          </a:p>
+        </p:txBody>
+      </p:sp>
+      <p:sp>
+        <p:nvSpPr>
+          <p:cNvPr id="10" name="TextBox 9">
+            <a:extLst>
+              <a:ext uri="{FF2B5EF4-FFF2-40B4-BE49-F238E27FC236}">
+                <a16:creationId xmlns:a16="http://schemas.microsoft.com/office/drawing/2014/main" id="{92F16A69-82CB-DE4F-9F91-AAE472D304D1}"/>
+              </a:ext>
+            </a:extLst>
+          </p:cNvPr>
+          <p:cNvSpPr txBox="1"/>
+          <p:nvPr/>
+        </p:nvSpPr>
+        <p:spPr>
+          <a:xfrm>
+            <a:off x="253813" y="4108873"/>
+            <a:ext cx="1242000" cy="400110"/>
+          </a:xfrm>
+          <a:prstGeom prst="rect">
+            <a:avLst/>
+          </a:prstGeom>
+          <a:noFill/>
+          <a:ln>
+            <a:solidFill>
+              <a:schemeClr val="tx1"/>
+            </a:solidFill>
+          </a:ln>
+        </p:spPr>
+        <p:txBody>
+          <a:bodyPr wrap="square" rtlCol="0">
+            <a:spAutoFit/>
+          </a:bodyPr>
+          <a:lstStyle/>
+          <a:p>
+            <a:pPr algn="ctr"/>
+            <a:r>
+              <a:rPr lang="en-GB" sz="1000" dirty="0" err="1">
+                <a:latin typeface="Courier" pitchFamily="2" charset="0"/>
+                <a:cs typeface="Futura Medium" panose="020B0602020204020303" pitchFamily="34" charset="-79"/>
+              </a:rPr>
+              <a:t>rgbif</a:t>
+            </a:r>
+            <a:endParaRPr lang="en-GB" sz="1000" dirty="0">
+              <a:latin typeface="Courier" pitchFamily="2" charset="0"/>
+              <a:cs typeface="Futura Medium" panose="020B0602020204020303" pitchFamily="34" charset="-79"/>
+            </a:endParaRPr>
+          </a:p>
+          <a:p>
+            <a:pPr algn="ctr"/>
+            <a:r>
+              <a:rPr lang="en-GB" sz="1000" dirty="0" err="1">
+                <a:latin typeface="Courier" pitchFamily="2" charset="0"/>
+                <a:cs typeface="Futura Medium" panose="020B0602020204020303" pitchFamily="34" charset="-79"/>
+              </a:rPr>
+              <a:t>rnaturalearth</a:t>
+            </a:r>
+            <a:endParaRPr lang="en-GB" sz="1000" dirty="0">
+              <a:latin typeface="Courier" pitchFamily="2" charset="0"/>
+              <a:cs typeface="Futura Medium" panose="020B0602020204020303" pitchFamily="34" charset="-79"/>
+            </a:endParaRPr>
+          </a:p>
+        </p:txBody>
+      </p:sp>
+      <p:sp>
+        <p:nvSpPr>
+          <p:cNvPr id="11" name="TextBox 10">
+            <a:extLst>
+              <a:ext uri="{FF2B5EF4-FFF2-40B4-BE49-F238E27FC236}">
+                <a16:creationId xmlns:a16="http://schemas.microsoft.com/office/drawing/2014/main" id="{0A970197-2D53-5E42-8340-0FBFC0C230D8}"/>
+              </a:ext>
+            </a:extLst>
+          </p:cNvPr>
+          <p:cNvSpPr txBox="1"/>
+          <p:nvPr/>
+        </p:nvSpPr>
+        <p:spPr>
+          <a:xfrm>
+            <a:off x="254376" y="3824296"/>
+            <a:ext cx="1242000" cy="276999"/>
+          </a:xfrm>
+          <a:prstGeom prst="rect">
+            <a:avLst/>
+          </a:prstGeom>
+          <a:noFill/>
+          <a:ln>
+            <a:solidFill>
+              <a:schemeClr val="tx1"/>
+            </a:solidFill>
+          </a:ln>
+        </p:spPr>
+        <p:txBody>
+          <a:bodyPr wrap="square" rtlCol="0">
+            <a:spAutoFit/>
+          </a:bodyPr>
+          <a:lstStyle/>
+          <a:p>
+            <a:r>
+              <a:rPr lang="en-GB" sz="1200" dirty="0">
+                <a:latin typeface="Futura Medium" panose="020B0602020204020303" pitchFamily="34" charset="-79"/>
+                <a:cs typeface="Futura Medium" panose="020B0602020204020303" pitchFamily="34" charset="-79"/>
+              </a:rPr>
+              <a:t>Online data</a:t>
+            </a:r>
+          </a:p>
+        </p:txBody>
+      </p:sp>
+      <p:pic>
+        <p:nvPicPr>
+          <p:cNvPr id="15" name="Graphic 14" descr="Download from cloud">
+            <a:extLst>
+              <a:ext uri="{FF2B5EF4-FFF2-40B4-BE49-F238E27FC236}">
+                <a16:creationId xmlns:a16="http://schemas.microsoft.com/office/drawing/2014/main" id="{DC8D413C-62EC-4544-A676-AE4A933873B7}"/>
+              </a:ext>
+            </a:extLst>
+          </p:cNvPr>
+          <p:cNvPicPr>
+            <a:picLocks noChangeAspect="1"/>
+          </p:cNvPicPr>
+          <p:nvPr/>
+        </p:nvPicPr>
+        <p:blipFill>
+          <a:blip r:embed="rId4">
+            <a:extLst>
+              <a:ext uri="{96DAC541-7B7A-43D3-8B79-37D633B846F1}">
+                <asvg:svgBlip xmlns:asvg="http://schemas.microsoft.com/office/drawing/2016/SVG/main" r:embed="rId5"/>
+              </a:ext>
+            </a:extLst>
+          </a:blip>
+          <a:stretch>
+            <a:fillRect/>
+          </a:stretch>
+        </p:blipFill>
+        <p:spPr>
+          <a:xfrm>
+            <a:off x="1205977" y="3833831"/>
+            <a:ext cx="270000" cy="270000"/>
+          </a:xfrm>
+          <a:prstGeom prst="rect">
+            <a:avLst/>
+          </a:prstGeom>
+        </p:spPr>
+      </p:pic>
+      <p:pic>
+        <p:nvPicPr>
+          <p:cNvPr id="16" name="Graphic 15" descr="Table">
+            <a:extLst>
+              <a:ext uri="{FF2B5EF4-FFF2-40B4-BE49-F238E27FC236}">
+                <a16:creationId xmlns:a16="http://schemas.microsoft.com/office/drawing/2014/main" id="{470D1811-1AC5-3445-8A1B-B9D8F55ACA95}"/>
+              </a:ext>
+            </a:extLst>
+          </p:cNvPr>
+          <p:cNvPicPr>
+            <a:picLocks noChangeAspect="1"/>
+          </p:cNvPicPr>
+          <p:nvPr/>
+        </p:nvPicPr>
+        <p:blipFill>
+          <a:blip r:embed="rId6">
+            <a:extLst>
+              <a:ext uri="{96DAC541-7B7A-43D3-8B79-37D633B846F1}">
+                <asvg:svgBlip xmlns:asvg="http://schemas.microsoft.com/office/drawing/2016/SVG/main" r:embed="rId7"/>
+              </a:ext>
+            </a:extLst>
+          </a:blip>
+          <a:stretch>
+            <a:fillRect/>
+          </a:stretch>
+        </p:blipFill>
+        <p:spPr>
+          <a:xfrm>
+            <a:off x="1165237" y="2253709"/>
+            <a:ext cx="270000" cy="270000"/>
+          </a:xfrm>
+          <a:prstGeom prst="rect">
+            <a:avLst/>
+          </a:prstGeom>
+        </p:spPr>
+      </p:pic>
+      <p:pic>
+        <p:nvPicPr>
+          <p:cNvPr id="17" name="Graphic 16" descr="World">
+            <a:extLst>
+              <a:ext uri="{FF2B5EF4-FFF2-40B4-BE49-F238E27FC236}">
+                <a16:creationId xmlns:a16="http://schemas.microsoft.com/office/drawing/2014/main" id="{58A60619-5901-404C-8830-5025329E68C1}"/>
+              </a:ext>
+            </a:extLst>
+          </p:cNvPr>
+          <p:cNvPicPr>
+            <a:picLocks noChangeAspect="1"/>
+          </p:cNvPicPr>
+          <p:nvPr/>
+        </p:nvPicPr>
+        <p:blipFill>
+          <a:blip r:embed="rId8">
+            <a:extLst>
+              <a:ext uri="{96DAC541-7B7A-43D3-8B79-37D633B846F1}">
+                <asvg:svgBlip xmlns:asvg="http://schemas.microsoft.com/office/drawing/2016/SVG/main" r:embed="rId9"/>
+              </a:ext>
+            </a:extLst>
+          </a:blip>
+          <a:stretch>
+            <a:fillRect/>
+          </a:stretch>
+        </p:blipFill>
+        <p:spPr>
+          <a:xfrm>
+            <a:off x="1165237" y="3037345"/>
+            <a:ext cx="270000" cy="270000"/>
+          </a:xfrm>
+          <a:prstGeom prst="rect">
+            <a:avLst/>
+          </a:prstGeom>
+        </p:spPr>
+      </p:pic>
+      <p:sp>
+        <p:nvSpPr>
+          <p:cNvPr id="18" name="TextBox 17">
+            <a:extLst>
+              <a:ext uri="{FF2B5EF4-FFF2-40B4-BE49-F238E27FC236}">
+                <a16:creationId xmlns:a16="http://schemas.microsoft.com/office/drawing/2014/main" id="{77320683-651C-2C46-A261-A719D3840477}"/>
+              </a:ext>
+            </a:extLst>
+          </p:cNvPr>
+          <p:cNvSpPr txBox="1"/>
+          <p:nvPr/>
+        </p:nvSpPr>
+        <p:spPr>
+          <a:xfrm>
+            <a:off x="3272056" y="1563454"/>
+            <a:ext cx="1764000" cy="523220"/>
+          </a:xfrm>
+          <a:prstGeom prst="rect">
+            <a:avLst/>
+          </a:prstGeom>
+          <a:noFill/>
+          <a:ln>
+            <a:solidFill>
+              <a:schemeClr val="tx1"/>
+            </a:solidFill>
+          </a:ln>
+        </p:spPr>
+        <p:txBody>
+          <a:bodyPr wrap="square" rtlCol="0">
+            <a:spAutoFit/>
+          </a:bodyPr>
+          <a:lstStyle/>
+          <a:p>
+            <a:pPr algn="ctr"/>
+            <a:r>
+              <a:rPr lang="en-GB" sz="1400" dirty="0">
+                <a:latin typeface="Futura Medium" panose="020B0602020204020303" pitchFamily="34" charset="-79"/>
+                <a:cs typeface="Futura Medium" panose="020B0602020204020303" pitchFamily="34" charset="-79"/>
+              </a:rPr>
+              <a:t>Quantify landscape characteristics</a:t>
+            </a:r>
+          </a:p>
+        </p:txBody>
+      </p:sp>
+      <p:sp>
+        <p:nvSpPr>
+          <p:cNvPr id="19" name="TextBox 18">
+            <a:extLst>
+              <a:ext uri="{FF2B5EF4-FFF2-40B4-BE49-F238E27FC236}">
+                <a16:creationId xmlns:a16="http://schemas.microsoft.com/office/drawing/2014/main" id="{69B1D658-63F5-A341-AD44-563BCD57F2EF}"/>
+              </a:ext>
+            </a:extLst>
+          </p:cNvPr>
+          <p:cNvSpPr txBox="1"/>
+          <p:nvPr/>
+        </p:nvSpPr>
+        <p:spPr>
+          <a:xfrm>
+            <a:off x="7131252" y="1563208"/>
+            <a:ext cx="1242000" cy="523220"/>
+          </a:xfrm>
+          <a:prstGeom prst="rect">
+            <a:avLst/>
+          </a:prstGeom>
+          <a:noFill/>
+          <a:ln>
+            <a:solidFill>
+              <a:schemeClr val="tx1"/>
+            </a:solidFill>
+          </a:ln>
+        </p:spPr>
+        <p:txBody>
+          <a:bodyPr wrap="square" rtlCol="0">
+            <a:spAutoFit/>
+          </a:bodyPr>
+          <a:lstStyle/>
+          <a:p>
+            <a:pPr algn="ctr"/>
+            <a:r>
+              <a:rPr lang="en-GB" sz="1400" dirty="0">
+                <a:latin typeface="Futura Medium" panose="020B0602020204020303" pitchFamily="34" charset="-79"/>
+                <a:cs typeface="Futura Medium" panose="020B0602020204020303" pitchFamily="34" charset="-79"/>
+              </a:rPr>
+              <a:t>Create </a:t>
+            </a:r>
+          </a:p>
+          <a:p>
+            <a:pPr algn="ctr"/>
+            <a:r>
+              <a:rPr lang="en-GB" sz="1400" dirty="0">
+                <a:latin typeface="Futura Medium" panose="020B0602020204020303" pitchFamily="34" charset="-79"/>
+                <a:cs typeface="Futura Medium" panose="020B0602020204020303" pitchFamily="34" charset="-79"/>
+              </a:rPr>
+              <a:t>maps</a:t>
+            </a:r>
+          </a:p>
+        </p:txBody>
+      </p:sp>
+      <p:pic>
+        <p:nvPicPr>
+          <p:cNvPr id="20" name="Graphic 19" descr="Tools">
+            <a:extLst>
+              <a:ext uri="{FF2B5EF4-FFF2-40B4-BE49-F238E27FC236}">
+                <a16:creationId xmlns:a16="http://schemas.microsoft.com/office/drawing/2014/main" id="{DE0CEE49-E857-864A-AB7C-178E7FEA4B21}"/>
+              </a:ext>
+            </a:extLst>
+          </p:cNvPr>
+          <p:cNvPicPr>
+            <a:picLocks noChangeAspect="1"/>
+          </p:cNvPicPr>
+          <p:nvPr/>
+        </p:nvPicPr>
+        <p:blipFill>
+          <a:blip r:embed="rId10">
+            <a:extLst>
+              <a:ext uri="{96DAC541-7B7A-43D3-8B79-37D633B846F1}">
+                <asvg:svgBlip xmlns:asvg="http://schemas.microsoft.com/office/drawing/2016/SVG/main" r:embed="rId11"/>
+              </a:ext>
+            </a:extLst>
+          </a:blip>
+          <a:stretch>
+            <a:fillRect/>
+          </a:stretch>
+        </p:blipFill>
+        <p:spPr>
+          <a:xfrm>
+            <a:off x="2112257" y="982421"/>
+            <a:ext cx="540000" cy="540000"/>
+          </a:xfrm>
+          <a:prstGeom prst="rect">
+            <a:avLst/>
+          </a:prstGeom>
+        </p:spPr>
+      </p:pic>
+      <p:sp>
+        <p:nvSpPr>
+          <p:cNvPr id="21" name="TextBox 20">
+            <a:extLst>
+              <a:ext uri="{FF2B5EF4-FFF2-40B4-BE49-F238E27FC236}">
+                <a16:creationId xmlns:a16="http://schemas.microsoft.com/office/drawing/2014/main" id="{31EA7560-83BD-E545-B7A9-F60E3B745225}"/>
+              </a:ext>
+            </a:extLst>
+          </p:cNvPr>
+          <p:cNvSpPr txBox="1"/>
+          <p:nvPr/>
+        </p:nvSpPr>
+        <p:spPr>
+          <a:xfrm>
+            <a:off x="1755706" y="2525601"/>
+            <a:ext cx="1242000" cy="400110"/>
+          </a:xfrm>
+          <a:prstGeom prst="rect">
+            <a:avLst/>
+          </a:prstGeom>
+          <a:noFill/>
+          <a:ln>
+            <a:solidFill>
+              <a:schemeClr val="tx1"/>
+            </a:solidFill>
+          </a:ln>
+        </p:spPr>
+        <p:txBody>
+          <a:bodyPr wrap="square" rtlCol="0">
+            <a:spAutoFit/>
+          </a:bodyPr>
+          <a:lstStyle/>
+          <a:p>
+            <a:pPr algn="ctr"/>
+            <a:r>
+              <a:rPr lang="en-GB" sz="1000" dirty="0">
+                <a:latin typeface="Courier" pitchFamily="2" charset="0"/>
+                <a:cs typeface="Futura Medium" panose="020B0602020204020303" pitchFamily="34" charset="-79"/>
+              </a:rPr>
+              <a:t>raster</a:t>
+            </a:r>
+          </a:p>
+          <a:p>
+            <a:pPr algn="ctr"/>
+            <a:r>
+              <a:rPr lang="en-GB" sz="1000" dirty="0">
+                <a:latin typeface="Courier" pitchFamily="2" charset="0"/>
+                <a:cs typeface="Futura Medium" panose="020B0602020204020303" pitchFamily="34" charset="-79"/>
+              </a:rPr>
+              <a:t>stars</a:t>
+            </a:r>
+          </a:p>
+        </p:txBody>
+      </p:sp>
+      <p:sp>
+        <p:nvSpPr>
+          <p:cNvPr id="22" name="TextBox 21">
+            <a:extLst>
+              <a:ext uri="{FF2B5EF4-FFF2-40B4-BE49-F238E27FC236}">
+                <a16:creationId xmlns:a16="http://schemas.microsoft.com/office/drawing/2014/main" id="{36AEEE6E-79B3-0D4E-AEB9-1181B25635DF}"/>
+              </a:ext>
+            </a:extLst>
+          </p:cNvPr>
+          <p:cNvSpPr txBox="1"/>
+          <p:nvPr/>
+        </p:nvSpPr>
+        <p:spPr>
+          <a:xfrm>
+            <a:off x="1761257" y="2246710"/>
+            <a:ext cx="1242000" cy="276999"/>
+          </a:xfrm>
+          <a:prstGeom prst="rect">
+            <a:avLst/>
+          </a:prstGeom>
+          <a:noFill/>
+          <a:ln>
+            <a:solidFill>
+              <a:schemeClr val="tx1"/>
+            </a:solidFill>
+          </a:ln>
+        </p:spPr>
+        <p:txBody>
+          <a:bodyPr wrap="square" rtlCol="0">
+            <a:spAutoFit/>
+          </a:bodyPr>
+          <a:lstStyle/>
+          <a:p>
+            <a:r>
+              <a:rPr lang="en-GB" sz="1200" dirty="0">
+                <a:latin typeface="Futura Medium" panose="020B0602020204020303" pitchFamily="34" charset="-79"/>
+                <a:cs typeface="Futura Medium" panose="020B0602020204020303" pitchFamily="34" charset="-79"/>
+              </a:rPr>
+              <a:t>Raster data</a:t>
+            </a:r>
+          </a:p>
+        </p:txBody>
+      </p:sp>
+      <p:sp>
+        <p:nvSpPr>
+          <p:cNvPr id="23" name="TextBox 22">
+            <a:extLst>
+              <a:ext uri="{FF2B5EF4-FFF2-40B4-BE49-F238E27FC236}">
+                <a16:creationId xmlns:a16="http://schemas.microsoft.com/office/drawing/2014/main" id="{71CF0828-8243-8949-8705-15E3774C87F9}"/>
+              </a:ext>
+            </a:extLst>
+          </p:cNvPr>
+          <p:cNvSpPr txBox="1"/>
+          <p:nvPr/>
+        </p:nvSpPr>
+        <p:spPr>
+          <a:xfrm>
+            <a:off x="1755706" y="3316239"/>
+            <a:ext cx="1242000" cy="400110"/>
+          </a:xfrm>
+          <a:prstGeom prst="rect">
+            <a:avLst/>
+          </a:prstGeom>
+          <a:noFill/>
+          <a:ln>
+            <a:solidFill>
+              <a:schemeClr val="tx1"/>
+            </a:solidFill>
+          </a:ln>
+        </p:spPr>
+        <p:txBody>
+          <a:bodyPr wrap="square" rtlCol="0">
+            <a:spAutoFit/>
+          </a:bodyPr>
+          <a:lstStyle/>
+          <a:p>
+            <a:pPr algn="ctr"/>
+            <a:r>
+              <a:rPr lang="en-GB" sz="1000" dirty="0" err="1">
+                <a:latin typeface="Courier" pitchFamily="2" charset="0"/>
+                <a:cs typeface="Futura Medium" panose="020B0602020204020303" pitchFamily="34" charset="-79"/>
+              </a:rPr>
+              <a:t>sp</a:t>
+            </a:r>
+            <a:endParaRPr lang="en-GB" sz="1000" dirty="0">
+              <a:latin typeface="Courier" pitchFamily="2" charset="0"/>
+              <a:cs typeface="Futura Medium" panose="020B0602020204020303" pitchFamily="34" charset="-79"/>
+            </a:endParaRPr>
+          </a:p>
+          <a:p>
+            <a:pPr algn="ctr"/>
+            <a:r>
+              <a:rPr lang="en-GB" sz="1000" dirty="0">
+                <a:latin typeface="Courier" pitchFamily="2" charset="0"/>
+                <a:cs typeface="Futura Medium" panose="020B0602020204020303" pitchFamily="34" charset="-79"/>
+              </a:rPr>
+              <a:t>sf</a:t>
+            </a:r>
+          </a:p>
+        </p:txBody>
+      </p:sp>
+      <p:sp>
+        <p:nvSpPr>
+          <p:cNvPr id="24" name="TextBox 23">
+            <a:extLst>
+              <a:ext uri="{FF2B5EF4-FFF2-40B4-BE49-F238E27FC236}">
+                <a16:creationId xmlns:a16="http://schemas.microsoft.com/office/drawing/2014/main" id="{4AA24B7E-5948-6E4D-878A-9540A6868165}"/>
+              </a:ext>
+            </a:extLst>
+          </p:cNvPr>
+          <p:cNvSpPr txBox="1"/>
+          <p:nvPr/>
+        </p:nvSpPr>
+        <p:spPr>
+          <a:xfrm>
+            <a:off x="1755706" y="3037345"/>
+            <a:ext cx="1242000" cy="276999"/>
+          </a:xfrm>
+          <a:prstGeom prst="rect">
+            <a:avLst/>
+          </a:prstGeom>
+          <a:noFill/>
+          <a:ln>
+            <a:solidFill>
+              <a:schemeClr val="tx1"/>
+            </a:solidFill>
+          </a:ln>
+        </p:spPr>
+        <p:txBody>
+          <a:bodyPr wrap="square" rtlCol="0">
+            <a:spAutoFit/>
+          </a:bodyPr>
+          <a:lstStyle/>
+          <a:p>
+            <a:r>
+              <a:rPr lang="en-GB" sz="1200" dirty="0">
+                <a:latin typeface="Futura Medium" panose="020B0602020204020303" pitchFamily="34" charset="-79"/>
+                <a:cs typeface="Futura Medium" panose="020B0602020204020303" pitchFamily="34" charset="-79"/>
+              </a:rPr>
+              <a:t>Vector data</a:t>
+            </a:r>
+          </a:p>
+        </p:txBody>
+      </p:sp>
+      <p:pic>
+        <p:nvPicPr>
+          <p:cNvPr id="25" name="Graphic 24" descr="Table">
+            <a:extLst>
+              <a:ext uri="{FF2B5EF4-FFF2-40B4-BE49-F238E27FC236}">
+                <a16:creationId xmlns:a16="http://schemas.microsoft.com/office/drawing/2014/main" id="{DD407576-A875-9A46-8B7B-5F26FEDE98F8}"/>
+              </a:ext>
+            </a:extLst>
+          </p:cNvPr>
+          <p:cNvPicPr>
+            <a:picLocks noChangeAspect="1"/>
+          </p:cNvPicPr>
+          <p:nvPr/>
+        </p:nvPicPr>
+        <p:blipFill>
+          <a:blip r:embed="rId6">
+            <a:extLst>
+              <a:ext uri="{96DAC541-7B7A-43D3-8B79-37D633B846F1}">
+                <asvg:svgBlip xmlns:asvg="http://schemas.microsoft.com/office/drawing/2016/SVG/main" r:embed="rId7"/>
+              </a:ext>
+            </a:extLst>
+          </a:blip>
+          <a:stretch>
+            <a:fillRect/>
+          </a:stretch>
+        </p:blipFill>
+        <p:spPr>
+          <a:xfrm>
+            <a:off x="2695636" y="2246710"/>
+            <a:ext cx="270000" cy="270000"/>
+          </a:xfrm>
+          <a:prstGeom prst="rect">
+            <a:avLst/>
+          </a:prstGeom>
+        </p:spPr>
+      </p:pic>
+      <p:pic>
+        <p:nvPicPr>
+          <p:cNvPr id="26" name="Graphic 25" descr="World">
+            <a:extLst>
+              <a:ext uri="{FF2B5EF4-FFF2-40B4-BE49-F238E27FC236}">
+                <a16:creationId xmlns:a16="http://schemas.microsoft.com/office/drawing/2014/main" id="{52F7729B-A2C0-A149-9288-F01B732C7716}"/>
+              </a:ext>
+            </a:extLst>
+          </p:cNvPr>
+          <p:cNvPicPr>
+            <a:picLocks noChangeAspect="1"/>
+          </p:cNvPicPr>
+          <p:nvPr/>
+        </p:nvPicPr>
+        <p:blipFill>
+          <a:blip r:embed="rId8">
+            <a:extLst>
+              <a:ext uri="{96DAC541-7B7A-43D3-8B79-37D633B846F1}">
+                <asvg:svgBlip xmlns:asvg="http://schemas.microsoft.com/office/drawing/2016/SVG/main" r:embed="rId9"/>
+              </a:ext>
+            </a:extLst>
+          </a:blip>
+          <a:stretch>
+            <a:fillRect/>
+          </a:stretch>
+        </p:blipFill>
+        <p:spPr>
+          <a:xfrm>
+            <a:off x="2688456" y="3033133"/>
+            <a:ext cx="270000" cy="270000"/>
+          </a:xfrm>
+          <a:prstGeom prst="rect">
+            <a:avLst/>
+          </a:prstGeom>
+        </p:spPr>
+      </p:pic>
+      <p:sp>
+        <p:nvSpPr>
+          <p:cNvPr id="29" name="Pentagon 28">
+            <a:extLst>
+              <a:ext uri="{FF2B5EF4-FFF2-40B4-BE49-F238E27FC236}">
+                <a16:creationId xmlns:a16="http://schemas.microsoft.com/office/drawing/2014/main" id="{4FED3116-3AD4-DC4E-A36A-9A63932C33E6}"/>
+              </a:ext>
+            </a:extLst>
+          </p:cNvPr>
+          <p:cNvSpPr/>
+          <p:nvPr/>
+        </p:nvSpPr>
+        <p:spPr>
+          <a:xfrm>
+            <a:off x="253812" y="126374"/>
+            <a:ext cx="8102249" cy="744279"/>
+          </a:xfrm>
+          <a:prstGeom prst="homePlate">
+            <a:avLst>
+              <a:gd name="adj" fmla="val 142857"/>
+            </a:avLst>
+          </a:prstGeom>
+          <a:solidFill>
+            <a:schemeClr val="bg1"/>
+          </a:solidFill>
+          <a:ln w="38100">
+            <a:solidFill>
+              <a:schemeClr val="tx1"/>
+            </a:solidFill>
+          </a:ln>
+        </p:spPr>
+        <p:style>
+          <a:lnRef idx="2">
+            <a:schemeClr val="accent1">
+              <a:shade val="50000"/>
+            </a:schemeClr>
+          </a:lnRef>
+          <a:fillRef idx="1">
+            <a:schemeClr val="accent1"/>
+          </a:fillRef>
+          <a:effectRef idx="0">
+            <a:schemeClr val="accent1"/>
+          </a:effectRef>
+          <a:fontRef idx="minor">
+            <a:schemeClr val="lt1"/>
+          </a:fontRef>
+        </p:style>
+        <p:txBody>
+          <a:bodyPr rtlCol="0" anchor="ctr"/>
+          <a:lstStyle/>
+          <a:p>
+            <a:pPr algn="ctr"/>
+            <a:r>
+              <a:rPr lang="en-GB" sz="1400" dirty="0">
+                <a:solidFill>
+                  <a:schemeClr val="tx1"/>
+                </a:solidFill>
+                <a:latin typeface="Futura Medium" panose="020B0602020204020303" pitchFamily="34" charset="-79"/>
+                <a:cs typeface="Futura Medium" panose="020B0602020204020303" pitchFamily="34" charset="-79"/>
+              </a:rPr>
+              <a:t>Exemplary workflow in landscape ecology in [</a:t>
+            </a:r>
+            <a:r>
+              <a:rPr lang="en-GB" sz="1400" dirty="0">
+                <a:solidFill>
+                  <a:schemeClr val="tx1"/>
+                </a:solidFill>
+                <a:latin typeface="Courier" pitchFamily="2" charset="0"/>
+                <a:cs typeface="Futura Medium" panose="020B0602020204020303" pitchFamily="34" charset="-79"/>
+              </a:rPr>
+              <a:t>R</a:t>
+            </a:r>
+            <a:r>
+              <a:rPr lang="en-GB" sz="1400" dirty="0">
+                <a:solidFill>
+                  <a:schemeClr val="tx1"/>
+                </a:solidFill>
+                <a:latin typeface="Futura Medium" panose="020B0602020204020303" pitchFamily="34" charset="-79"/>
+                <a:cs typeface="Futura Medium" panose="020B0602020204020303" pitchFamily="34" charset="-79"/>
+              </a:rPr>
+              <a:t>]</a:t>
+            </a:r>
+          </a:p>
+        </p:txBody>
+      </p:sp>
+      <p:sp>
+        <p:nvSpPr>
+          <p:cNvPr id="30" name="TextBox 29">
+            <a:extLst>
+              <a:ext uri="{FF2B5EF4-FFF2-40B4-BE49-F238E27FC236}">
+                <a16:creationId xmlns:a16="http://schemas.microsoft.com/office/drawing/2014/main" id="{210D9CD0-8D4A-D944-A6C7-A2DE13C4EF6F}"/>
+              </a:ext>
+            </a:extLst>
+          </p:cNvPr>
+          <p:cNvSpPr txBox="1"/>
+          <p:nvPr/>
+        </p:nvSpPr>
+        <p:spPr>
+          <a:xfrm>
+            <a:off x="3268411" y="2524661"/>
+            <a:ext cx="1764000" cy="400110"/>
+          </a:xfrm>
+          <a:prstGeom prst="rect">
+            <a:avLst/>
+          </a:prstGeom>
+          <a:noFill/>
+          <a:ln>
+            <a:solidFill>
+              <a:schemeClr val="tx1"/>
+            </a:solidFill>
+          </a:ln>
+        </p:spPr>
+        <p:txBody>
+          <a:bodyPr wrap="square" rtlCol="0">
+            <a:spAutoFit/>
+          </a:bodyPr>
+          <a:lstStyle/>
+          <a:p>
+            <a:pPr algn="ctr"/>
+            <a:r>
+              <a:rPr lang="en-GB" sz="1000" dirty="0">
+                <a:latin typeface="Courier" pitchFamily="2" charset="0"/>
+                <a:cs typeface="Futura Medium" panose="020B0602020204020303" pitchFamily="34" charset="-79"/>
+              </a:rPr>
+              <a:t>landscapemetrics</a:t>
+            </a:r>
+          </a:p>
+          <a:p>
+            <a:pPr algn="ctr"/>
+            <a:r>
+              <a:rPr lang="en-GB" sz="1000" dirty="0" err="1">
+                <a:latin typeface="Courier" pitchFamily="2" charset="0"/>
+                <a:cs typeface="Futura Medium" panose="020B0602020204020303" pitchFamily="34" charset="-79"/>
+              </a:rPr>
+              <a:t>belg</a:t>
+            </a:r>
+            <a:endParaRPr lang="en-GB" sz="1000" dirty="0">
+              <a:latin typeface="Courier" pitchFamily="2" charset="0"/>
+              <a:cs typeface="Futura Medium" panose="020B0602020204020303" pitchFamily="34" charset="-79"/>
+            </a:endParaRPr>
+          </a:p>
+        </p:txBody>
+      </p:sp>
+      <p:sp>
+        <p:nvSpPr>
+          <p:cNvPr id="31" name="TextBox 30">
+            <a:extLst>
+              <a:ext uri="{FF2B5EF4-FFF2-40B4-BE49-F238E27FC236}">
+                <a16:creationId xmlns:a16="http://schemas.microsoft.com/office/drawing/2014/main" id="{E6367AF2-2C37-6447-ABAD-5EC87701450E}"/>
+              </a:ext>
+            </a:extLst>
+          </p:cNvPr>
+          <p:cNvSpPr txBox="1"/>
+          <p:nvPr/>
+        </p:nvSpPr>
+        <p:spPr>
+          <a:xfrm>
+            <a:off x="3270038" y="2246710"/>
+            <a:ext cx="1764000" cy="276999"/>
+          </a:xfrm>
+          <a:prstGeom prst="rect">
+            <a:avLst/>
+          </a:prstGeom>
+          <a:noFill/>
+          <a:ln>
+            <a:solidFill>
+              <a:schemeClr val="tx1"/>
+            </a:solidFill>
+          </a:ln>
+        </p:spPr>
+        <p:txBody>
+          <a:bodyPr wrap="square" rtlCol="0">
+            <a:spAutoFit/>
+          </a:bodyPr>
+          <a:lstStyle/>
+          <a:p>
+            <a:r>
+              <a:rPr lang="en-GB" sz="1200" dirty="0">
+                <a:latin typeface="Futura Medium" panose="020B0602020204020303" pitchFamily="34" charset="-79"/>
+                <a:cs typeface="Futura Medium" panose="020B0602020204020303" pitchFamily="34" charset="-79"/>
+              </a:rPr>
+              <a:t>Raster data</a:t>
+            </a:r>
+          </a:p>
+        </p:txBody>
+      </p:sp>
+      <p:pic>
+        <p:nvPicPr>
+          <p:cNvPr id="32" name="Graphic 31" descr="Table">
+            <a:extLst>
+              <a:ext uri="{FF2B5EF4-FFF2-40B4-BE49-F238E27FC236}">
+                <a16:creationId xmlns:a16="http://schemas.microsoft.com/office/drawing/2014/main" id="{2A51C47A-AA25-FD48-9A72-D9CB62A0D8B1}"/>
+              </a:ext>
+            </a:extLst>
+          </p:cNvPr>
+          <p:cNvPicPr>
+            <a:picLocks noChangeAspect="1"/>
+          </p:cNvPicPr>
+          <p:nvPr/>
+        </p:nvPicPr>
+        <p:blipFill>
+          <a:blip r:embed="rId6">
+            <a:extLst>
+              <a:ext uri="{96DAC541-7B7A-43D3-8B79-37D633B846F1}">
+                <asvg:svgBlip xmlns:asvg="http://schemas.microsoft.com/office/drawing/2016/SVG/main" r:embed="rId7"/>
+              </a:ext>
+            </a:extLst>
+          </a:blip>
+          <a:stretch>
+            <a:fillRect/>
+          </a:stretch>
+        </p:blipFill>
+        <p:spPr>
+          <a:xfrm>
+            <a:off x="4688355" y="2255997"/>
+            <a:ext cx="270000" cy="270000"/>
+          </a:xfrm>
+          <a:prstGeom prst="rect">
+            <a:avLst/>
+          </a:prstGeom>
+        </p:spPr>
+      </p:pic>
+      <p:sp>
+        <p:nvSpPr>
+          <p:cNvPr id="35" name="TextBox 34">
+            <a:extLst>
+              <a:ext uri="{FF2B5EF4-FFF2-40B4-BE49-F238E27FC236}">
+                <a16:creationId xmlns:a16="http://schemas.microsoft.com/office/drawing/2014/main" id="{6E5B863F-8AC9-DC44-AE98-92DA07DA10A9}"/>
+              </a:ext>
+            </a:extLst>
+          </p:cNvPr>
+          <p:cNvSpPr txBox="1"/>
+          <p:nvPr/>
+        </p:nvSpPr>
+        <p:spPr>
+          <a:xfrm>
+            <a:off x="3269609" y="3314344"/>
+            <a:ext cx="1764000" cy="400110"/>
+          </a:xfrm>
+          <a:prstGeom prst="rect">
+            <a:avLst/>
+          </a:prstGeom>
+          <a:noFill/>
+          <a:ln>
+            <a:solidFill>
+              <a:schemeClr val="tx1"/>
+            </a:solidFill>
+          </a:ln>
+        </p:spPr>
+        <p:txBody>
+          <a:bodyPr wrap="square" rtlCol="0">
+            <a:spAutoFit/>
+          </a:bodyPr>
+          <a:lstStyle/>
+          <a:p>
+            <a:pPr algn="ctr"/>
+            <a:r>
+              <a:rPr lang="en-GB" sz="1000" dirty="0">
+                <a:latin typeface="Courier" pitchFamily="2" charset="0"/>
+                <a:cs typeface="Futura Medium" panose="020B0602020204020303" pitchFamily="34" charset="-79"/>
+              </a:rPr>
+              <a:t>VLSM</a:t>
+            </a:r>
+          </a:p>
+          <a:p>
+            <a:pPr algn="ctr"/>
+            <a:r>
+              <a:rPr lang="en-GB" sz="1000" dirty="0">
+                <a:latin typeface="Courier" pitchFamily="2" charset="0"/>
+                <a:cs typeface="Futura Medium" panose="020B0602020204020303" pitchFamily="34" charset="-79"/>
+              </a:rPr>
+              <a:t>sf</a:t>
+            </a:r>
+          </a:p>
+        </p:txBody>
+      </p:sp>
+      <p:sp>
+        <p:nvSpPr>
+          <p:cNvPr id="36" name="TextBox 35">
+            <a:extLst>
+              <a:ext uri="{FF2B5EF4-FFF2-40B4-BE49-F238E27FC236}">
+                <a16:creationId xmlns:a16="http://schemas.microsoft.com/office/drawing/2014/main" id="{1D014CB9-D739-CD43-9EBB-04C5B286BC56}"/>
+              </a:ext>
+            </a:extLst>
+          </p:cNvPr>
+          <p:cNvSpPr txBox="1"/>
+          <p:nvPr/>
+        </p:nvSpPr>
+        <p:spPr>
+          <a:xfrm>
+            <a:off x="3274458" y="3037345"/>
+            <a:ext cx="1764000" cy="276999"/>
+          </a:xfrm>
+          <a:prstGeom prst="rect">
+            <a:avLst/>
+          </a:prstGeom>
+          <a:noFill/>
+          <a:ln>
+            <a:solidFill>
+              <a:schemeClr val="tx1"/>
+            </a:solidFill>
+          </a:ln>
+        </p:spPr>
+        <p:txBody>
+          <a:bodyPr wrap="square" rtlCol="0">
+            <a:spAutoFit/>
+          </a:bodyPr>
+          <a:lstStyle/>
+          <a:p>
+            <a:r>
+              <a:rPr lang="en-GB" sz="1200" dirty="0">
+                <a:latin typeface="Futura Medium" panose="020B0602020204020303" pitchFamily="34" charset="-79"/>
+                <a:cs typeface="Futura Medium" panose="020B0602020204020303" pitchFamily="34" charset="-79"/>
+              </a:rPr>
+              <a:t>Vector data</a:t>
+            </a:r>
+          </a:p>
+        </p:txBody>
+      </p:sp>
+      <p:pic>
+        <p:nvPicPr>
+          <p:cNvPr id="37" name="Graphic 36" descr="World">
+            <a:extLst>
+              <a:ext uri="{FF2B5EF4-FFF2-40B4-BE49-F238E27FC236}">
+                <a16:creationId xmlns:a16="http://schemas.microsoft.com/office/drawing/2014/main" id="{7BA91F7D-6429-8A46-A844-64DBCB0CD0D6}"/>
+              </a:ext>
+            </a:extLst>
+          </p:cNvPr>
+          <p:cNvPicPr>
+            <a:picLocks/>
+          </p:cNvPicPr>
+          <p:nvPr/>
+        </p:nvPicPr>
+        <p:blipFill>
+          <a:blip r:embed="rId8">
+            <a:extLst>
+              <a:ext uri="{96DAC541-7B7A-43D3-8B79-37D633B846F1}">
+                <asvg:svgBlip xmlns:asvg="http://schemas.microsoft.com/office/drawing/2016/SVG/main" r:embed="rId9"/>
+              </a:ext>
+            </a:extLst>
+          </a:blip>
+          <a:stretch>
+            <a:fillRect/>
+          </a:stretch>
+        </p:blipFill>
+        <p:spPr>
+          <a:xfrm>
+            <a:off x="4688355" y="3015133"/>
+            <a:ext cx="270000" cy="306000"/>
+          </a:xfrm>
+          <a:prstGeom prst="rect">
+            <a:avLst/>
+          </a:prstGeom>
+        </p:spPr>
+      </p:pic>
+      <p:sp>
+        <p:nvSpPr>
+          <p:cNvPr id="38" name="TextBox 37">
+            <a:extLst>
+              <a:ext uri="{FF2B5EF4-FFF2-40B4-BE49-F238E27FC236}">
+                <a16:creationId xmlns:a16="http://schemas.microsoft.com/office/drawing/2014/main" id="{A41A531C-444F-9E46-A469-EA9DACCB4044}"/>
+              </a:ext>
+            </a:extLst>
+          </p:cNvPr>
+          <p:cNvSpPr txBox="1"/>
+          <p:nvPr/>
+        </p:nvSpPr>
+        <p:spPr>
+          <a:xfrm>
+            <a:off x="5292774" y="2523709"/>
+            <a:ext cx="1566000" cy="400110"/>
+          </a:xfrm>
+          <a:prstGeom prst="rect">
+            <a:avLst/>
+          </a:prstGeom>
+          <a:noFill/>
+          <a:ln>
+            <a:solidFill>
+              <a:schemeClr val="tx1"/>
+            </a:solidFill>
+          </a:ln>
+        </p:spPr>
+        <p:txBody>
+          <a:bodyPr wrap="square" rtlCol="0">
+            <a:spAutoFit/>
+          </a:bodyPr>
+          <a:lstStyle/>
+          <a:p>
+            <a:pPr algn="ctr"/>
+            <a:r>
+              <a:rPr lang="en-GB" sz="1000" dirty="0">
+                <a:latin typeface="Courier" pitchFamily="2" charset="0"/>
+                <a:cs typeface="Futura Medium" panose="020B0602020204020303" pitchFamily="34" charset="-79"/>
+              </a:rPr>
+              <a:t>NLMR</a:t>
+            </a:r>
+          </a:p>
+          <a:p>
+            <a:pPr algn="ctr"/>
+            <a:r>
+              <a:rPr lang="en-GB" sz="1000" dirty="0" err="1">
+                <a:latin typeface="Courier" pitchFamily="2" charset="0"/>
+                <a:cs typeface="Futura Medium" panose="020B0602020204020303" pitchFamily="34" charset="-79"/>
+              </a:rPr>
+              <a:t>RandomFields</a:t>
+            </a:r>
+            <a:endParaRPr lang="en-GB" sz="1000" dirty="0">
+              <a:latin typeface="Courier" pitchFamily="2" charset="0"/>
+              <a:cs typeface="Futura Medium" panose="020B0602020204020303" pitchFamily="34" charset="-79"/>
+            </a:endParaRPr>
+          </a:p>
+        </p:txBody>
+      </p:sp>
+      <p:sp>
+        <p:nvSpPr>
+          <p:cNvPr id="39" name="TextBox 38">
+            <a:extLst>
+              <a:ext uri="{FF2B5EF4-FFF2-40B4-BE49-F238E27FC236}">
+                <a16:creationId xmlns:a16="http://schemas.microsoft.com/office/drawing/2014/main" id="{0DC08FB9-D5B5-6D46-A85B-595BE69E52F0}"/>
+              </a:ext>
+            </a:extLst>
+          </p:cNvPr>
+          <p:cNvSpPr txBox="1"/>
+          <p:nvPr/>
+        </p:nvSpPr>
+        <p:spPr>
+          <a:xfrm>
+            <a:off x="5295643" y="2240469"/>
+            <a:ext cx="1566000" cy="276999"/>
+          </a:xfrm>
+          <a:prstGeom prst="rect">
+            <a:avLst/>
+          </a:prstGeom>
+          <a:noFill/>
+          <a:ln>
+            <a:solidFill>
+              <a:schemeClr val="tx1"/>
+            </a:solidFill>
+          </a:ln>
+        </p:spPr>
+        <p:txBody>
+          <a:bodyPr wrap="square" rtlCol="0">
+            <a:spAutoFit/>
+          </a:bodyPr>
+          <a:lstStyle/>
+          <a:p>
+            <a:r>
+              <a:rPr lang="en-GB" sz="1200" dirty="0">
+                <a:latin typeface="Futura Medium" panose="020B0602020204020303" pitchFamily="34" charset="-79"/>
+                <a:cs typeface="Futura Medium" panose="020B0602020204020303" pitchFamily="34" charset="-79"/>
+              </a:rPr>
+              <a:t>Raster data</a:t>
+            </a:r>
+          </a:p>
+        </p:txBody>
+      </p:sp>
+      <p:pic>
+        <p:nvPicPr>
+          <p:cNvPr id="40" name="Graphic 39" descr="Table">
+            <a:extLst>
+              <a:ext uri="{FF2B5EF4-FFF2-40B4-BE49-F238E27FC236}">
+                <a16:creationId xmlns:a16="http://schemas.microsoft.com/office/drawing/2014/main" id="{B3CD3AF1-1632-0D45-80F6-EDA4B6CE7E14}"/>
+              </a:ext>
+            </a:extLst>
+          </p:cNvPr>
+          <p:cNvPicPr>
+            <a:picLocks noChangeAspect="1"/>
+          </p:cNvPicPr>
+          <p:nvPr/>
+        </p:nvPicPr>
+        <p:blipFill>
+          <a:blip r:embed="rId6">
+            <a:extLst>
+              <a:ext uri="{96DAC541-7B7A-43D3-8B79-37D633B846F1}">
+                <asvg:svgBlip xmlns:asvg="http://schemas.microsoft.com/office/drawing/2016/SVG/main" r:embed="rId7"/>
+              </a:ext>
+            </a:extLst>
+          </a:blip>
+          <a:stretch>
+            <a:fillRect/>
+          </a:stretch>
+        </p:blipFill>
+        <p:spPr>
+          <a:xfrm>
+            <a:off x="6551039" y="2253709"/>
+            <a:ext cx="270000" cy="270000"/>
+          </a:xfrm>
+          <a:prstGeom prst="rect">
+            <a:avLst/>
+          </a:prstGeom>
+        </p:spPr>
+      </p:pic>
+      <p:sp>
+        <p:nvSpPr>
+          <p:cNvPr id="42" name="TextBox 41">
+            <a:extLst>
+              <a:ext uri="{FF2B5EF4-FFF2-40B4-BE49-F238E27FC236}">
+                <a16:creationId xmlns:a16="http://schemas.microsoft.com/office/drawing/2014/main" id="{E3D4195D-B800-5842-9C3A-1862DC531010}"/>
+              </a:ext>
+            </a:extLst>
+          </p:cNvPr>
+          <p:cNvSpPr txBox="1"/>
+          <p:nvPr/>
+        </p:nvSpPr>
+        <p:spPr>
+          <a:xfrm>
+            <a:off x="7131252" y="2533296"/>
+            <a:ext cx="1242000" cy="400110"/>
+          </a:xfrm>
+          <a:prstGeom prst="rect">
+            <a:avLst/>
+          </a:prstGeom>
+          <a:noFill/>
+          <a:ln>
+            <a:solidFill>
+              <a:schemeClr val="tx1"/>
+            </a:solidFill>
+          </a:ln>
+        </p:spPr>
+        <p:txBody>
+          <a:bodyPr wrap="square" rtlCol="0">
+            <a:spAutoFit/>
+          </a:bodyPr>
+          <a:lstStyle/>
+          <a:p>
+            <a:pPr algn="ctr"/>
+            <a:r>
+              <a:rPr lang="en-GB" sz="1000" dirty="0" err="1">
+                <a:latin typeface="Courier" pitchFamily="2" charset="0"/>
+                <a:cs typeface="Futura Medium" panose="020B0602020204020303" pitchFamily="34" charset="-79"/>
+              </a:rPr>
+              <a:t>ggspatial</a:t>
+            </a:r>
+            <a:endParaRPr lang="en-GB" sz="1000" dirty="0">
+              <a:latin typeface="Courier" pitchFamily="2" charset="0"/>
+              <a:cs typeface="Futura Medium" panose="020B0602020204020303" pitchFamily="34" charset="-79"/>
+            </a:endParaRPr>
+          </a:p>
+          <a:p>
+            <a:pPr algn="ctr"/>
+            <a:r>
+              <a:rPr lang="en-GB" sz="1000" dirty="0" err="1">
+                <a:latin typeface="Courier" pitchFamily="2" charset="0"/>
+                <a:cs typeface="Futura Medium" panose="020B0602020204020303" pitchFamily="34" charset="-79"/>
+              </a:rPr>
+              <a:t>tmap</a:t>
+            </a:r>
+            <a:endParaRPr lang="en-GB" sz="1000" dirty="0">
+              <a:latin typeface="Courier" pitchFamily="2" charset="0"/>
+              <a:cs typeface="Futura Medium" panose="020B0602020204020303" pitchFamily="34" charset="-79"/>
+            </a:endParaRPr>
+          </a:p>
+        </p:txBody>
+      </p:sp>
+      <p:sp>
+        <p:nvSpPr>
+          <p:cNvPr id="43" name="TextBox 42">
+            <a:extLst>
+              <a:ext uri="{FF2B5EF4-FFF2-40B4-BE49-F238E27FC236}">
+                <a16:creationId xmlns:a16="http://schemas.microsoft.com/office/drawing/2014/main" id="{143DF779-668F-8240-B945-7A9DD3B91963}"/>
+              </a:ext>
+            </a:extLst>
+          </p:cNvPr>
+          <p:cNvSpPr txBox="1"/>
+          <p:nvPr/>
+        </p:nvSpPr>
+        <p:spPr>
+          <a:xfrm>
+            <a:off x="7131252" y="2248170"/>
+            <a:ext cx="1242000" cy="276999"/>
+          </a:xfrm>
+          <a:prstGeom prst="rect">
+            <a:avLst/>
+          </a:prstGeom>
+          <a:noFill/>
+          <a:ln>
+            <a:solidFill>
+              <a:schemeClr val="tx1"/>
+            </a:solidFill>
+          </a:ln>
+        </p:spPr>
+        <p:txBody>
+          <a:bodyPr wrap="square" rtlCol="0">
+            <a:spAutoFit/>
+          </a:bodyPr>
+          <a:lstStyle/>
+          <a:p>
+            <a:r>
+              <a:rPr lang="en-GB" sz="1200" dirty="0">
+                <a:latin typeface="Futura Medium" panose="020B0602020204020303" pitchFamily="34" charset="-79"/>
+                <a:cs typeface="Futura Medium" panose="020B0602020204020303" pitchFamily="34" charset="-79"/>
+              </a:rPr>
+              <a:t>Advanced</a:t>
+            </a:r>
+          </a:p>
+        </p:txBody>
+      </p:sp>
+      <p:pic>
+        <p:nvPicPr>
+          <p:cNvPr id="44" name="Graphic 43" descr="Easel">
+            <a:extLst>
+              <a:ext uri="{FF2B5EF4-FFF2-40B4-BE49-F238E27FC236}">
+                <a16:creationId xmlns:a16="http://schemas.microsoft.com/office/drawing/2014/main" id="{A58360FE-6E6D-6F4F-BBC6-2303ABBF6181}"/>
+              </a:ext>
+            </a:extLst>
+          </p:cNvPr>
+          <p:cNvPicPr>
+            <a:picLocks noChangeAspect="1"/>
+          </p:cNvPicPr>
+          <p:nvPr/>
+        </p:nvPicPr>
+        <p:blipFill>
+          <a:blip r:embed="rId12">
+            <a:extLst>
+              <a:ext uri="{96DAC541-7B7A-43D3-8B79-37D633B846F1}">
+                <asvg:svgBlip xmlns:asvg="http://schemas.microsoft.com/office/drawing/2016/SVG/main" r:embed="rId13"/>
+              </a:ext>
+            </a:extLst>
+          </a:blip>
+          <a:stretch>
+            <a:fillRect/>
+          </a:stretch>
+        </p:blipFill>
+        <p:spPr>
+          <a:xfrm>
+            <a:off x="8059206" y="2253709"/>
+            <a:ext cx="270000" cy="270000"/>
+          </a:xfrm>
+          <a:prstGeom prst="rect">
+            <a:avLst/>
+          </a:prstGeom>
+        </p:spPr>
+      </p:pic>
+      <p:pic>
+        <p:nvPicPr>
+          <p:cNvPr id="46" name="Graphic 45" descr="Mathematics">
+            <a:extLst>
+              <a:ext uri="{FF2B5EF4-FFF2-40B4-BE49-F238E27FC236}">
+                <a16:creationId xmlns:a16="http://schemas.microsoft.com/office/drawing/2014/main" id="{E80403C6-5337-D34F-84D9-2861D9F2C92B}"/>
+              </a:ext>
+            </a:extLst>
+          </p:cNvPr>
+          <p:cNvPicPr>
+            <a:picLocks noChangeAspect="1"/>
+          </p:cNvPicPr>
+          <p:nvPr/>
+        </p:nvPicPr>
+        <p:blipFill>
+          <a:blip r:embed="rId14">
+            <a:extLst>
+              <a:ext uri="{96DAC541-7B7A-43D3-8B79-37D633B846F1}">
+                <asvg:svgBlip xmlns:asvg="http://schemas.microsoft.com/office/drawing/2016/SVG/main" r:embed="rId15"/>
+              </a:ext>
+            </a:extLst>
+          </a:blip>
+          <a:stretch>
+            <a:fillRect/>
+          </a:stretch>
+        </p:blipFill>
+        <p:spPr>
+          <a:xfrm>
+            <a:off x="3880411" y="1012348"/>
+            <a:ext cx="540000" cy="540000"/>
+          </a:xfrm>
+          <a:prstGeom prst="rect">
+            <a:avLst/>
+          </a:prstGeom>
+        </p:spPr>
+      </p:pic>
+      <p:pic>
+        <p:nvPicPr>
+          <p:cNvPr id="47" name="Graphic 46" descr="Presentation with bar chart">
+            <a:extLst>
+              <a:ext uri="{FF2B5EF4-FFF2-40B4-BE49-F238E27FC236}">
+                <a16:creationId xmlns:a16="http://schemas.microsoft.com/office/drawing/2014/main" id="{C64F7AE5-A625-D14A-B0E0-F54DC4D68379}"/>
+              </a:ext>
+            </a:extLst>
+          </p:cNvPr>
+          <p:cNvPicPr>
+            <a:picLocks noChangeAspect="1"/>
+          </p:cNvPicPr>
+          <p:nvPr/>
+        </p:nvPicPr>
+        <p:blipFill>
+          <a:blip r:embed="rId16">
+            <a:extLst>
+              <a:ext uri="{96DAC541-7B7A-43D3-8B79-37D633B846F1}">
+                <asvg:svgBlip xmlns:asvg="http://schemas.microsoft.com/office/drawing/2016/SVG/main" r:embed="rId17"/>
+              </a:ext>
+            </a:extLst>
+          </a:blip>
+          <a:stretch>
+            <a:fillRect/>
+          </a:stretch>
+        </p:blipFill>
+        <p:spPr>
+          <a:xfrm>
+            <a:off x="7482252" y="982421"/>
+            <a:ext cx="540000" cy="540000"/>
+          </a:xfrm>
+          <a:prstGeom prst="rect">
+            <a:avLst/>
+          </a:prstGeom>
+        </p:spPr>
+      </p:pic>
+      <p:pic>
+        <p:nvPicPr>
+          <p:cNvPr id="48" name="Graphic 47" descr="Arrow circle">
+            <a:extLst>
+              <a:ext uri="{FF2B5EF4-FFF2-40B4-BE49-F238E27FC236}">
+                <a16:creationId xmlns:a16="http://schemas.microsoft.com/office/drawing/2014/main" id="{9C3A91A9-AC5E-D249-8635-B66F6D565DDE}"/>
+              </a:ext>
+            </a:extLst>
+          </p:cNvPr>
+          <p:cNvPicPr>
+            <a:picLocks noChangeAspect="1"/>
+          </p:cNvPicPr>
+          <p:nvPr/>
+        </p:nvPicPr>
+        <p:blipFill>
+          <a:blip r:embed="rId18">
+            <a:extLst>
+              <a:ext uri="{96DAC541-7B7A-43D3-8B79-37D633B846F1}">
+                <asvg:svgBlip xmlns:asvg="http://schemas.microsoft.com/office/drawing/2016/SVG/main" r:embed="rId19"/>
+              </a:ext>
+            </a:extLst>
+          </a:blip>
+          <a:stretch>
+            <a:fillRect/>
+          </a:stretch>
+        </p:blipFill>
+        <p:spPr>
+          <a:xfrm>
+            <a:off x="5805774" y="982421"/>
+            <a:ext cx="540000" cy="540000"/>
+          </a:xfrm>
+          <a:prstGeom prst="rect">
+            <a:avLst/>
+          </a:prstGeom>
+        </p:spPr>
+      </p:pic>
+      <p:sp>
+        <p:nvSpPr>
+          <p:cNvPr id="49" name="TextBox 48">
+            <a:extLst>
+              <a:ext uri="{FF2B5EF4-FFF2-40B4-BE49-F238E27FC236}">
+                <a16:creationId xmlns:a16="http://schemas.microsoft.com/office/drawing/2014/main" id="{6765D1D5-335B-AD47-96A6-97B1094B33E1}"/>
+              </a:ext>
+            </a:extLst>
+          </p:cNvPr>
+          <p:cNvSpPr txBox="1"/>
+          <p:nvPr/>
+        </p:nvSpPr>
+        <p:spPr>
+          <a:xfrm>
+            <a:off x="1752507" y="4101295"/>
+            <a:ext cx="1242000" cy="400110"/>
+          </a:xfrm>
+          <a:prstGeom prst="rect">
+            <a:avLst/>
+          </a:prstGeom>
+          <a:noFill/>
+          <a:ln>
+            <a:solidFill>
+              <a:schemeClr val="tx1"/>
+            </a:solidFill>
+          </a:ln>
+        </p:spPr>
+        <p:txBody>
+          <a:bodyPr wrap="square" rtlCol="0">
+            <a:spAutoFit/>
+          </a:bodyPr>
+          <a:lstStyle/>
+          <a:p>
+            <a:pPr algn="ctr"/>
+            <a:r>
+              <a:rPr lang="en-US" sz="1000" dirty="0" err="1">
+                <a:latin typeface="Courier" pitchFamily="2" charset="0"/>
+              </a:rPr>
+              <a:t>gdalUtils</a:t>
+            </a:r>
+            <a:endParaRPr lang="en-GB" sz="1000" dirty="0">
+              <a:latin typeface="Courier" pitchFamily="2" charset="0"/>
+              <a:cs typeface="Futura Medium" panose="020B0602020204020303" pitchFamily="34" charset="-79"/>
+            </a:endParaRPr>
+          </a:p>
+          <a:p>
+            <a:pPr algn="ctr"/>
+            <a:r>
+              <a:rPr lang="en-US" sz="1000" dirty="0">
+                <a:latin typeface="Courier" pitchFamily="2" charset="0"/>
+                <a:cs typeface="Futura Medium" panose="020B0602020204020303" pitchFamily="34" charset="-79"/>
+              </a:rPr>
+              <a:t>rgrass7</a:t>
+            </a:r>
+            <a:endParaRPr lang="en-GB" sz="1000" dirty="0">
+              <a:latin typeface="Courier" pitchFamily="2" charset="0"/>
+              <a:cs typeface="Futura Medium" panose="020B0602020204020303" pitchFamily="34" charset="-79"/>
+            </a:endParaRPr>
+          </a:p>
+        </p:txBody>
+      </p:sp>
+      <p:sp>
+        <p:nvSpPr>
+          <p:cNvPr id="50" name="TextBox 49">
+            <a:extLst>
+              <a:ext uri="{FF2B5EF4-FFF2-40B4-BE49-F238E27FC236}">
+                <a16:creationId xmlns:a16="http://schemas.microsoft.com/office/drawing/2014/main" id="{0F245C10-CE08-AE44-BF9E-4E005A59D5CF}"/>
+              </a:ext>
+            </a:extLst>
+          </p:cNvPr>
+          <p:cNvSpPr txBox="1"/>
+          <p:nvPr/>
+        </p:nvSpPr>
+        <p:spPr>
+          <a:xfrm>
+            <a:off x="1752507" y="3824296"/>
+            <a:ext cx="1242000" cy="276999"/>
+          </a:xfrm>
+          <a:prstGeom prst="rect">
+            <a:avLst/>
+          </a:prstGeom>
+          <a:noFill/>
+          <a:ln>
+            <a:solidFill>
+              <a:schemeClr val="tx1"/>
+            </a:solidFill>
+          </a:ln>
+        </p:spPr>
+        <p:txBody>
+          <a:bodyPr wrap="square" rtlCol="0">
+            <a:spAutoFit/>
+          </a:bodyPr>
+          <a:lstStyle/>
+          <a:p>
+            <a:r>
+              <a:rPr lang="en-GB" sz="1200" dirty="0">
+                <a:latin typeface="Futura Medium" panose="020B0602020204020303" pitchFamily="34" charset="-79"/>
+                <a:cs typeface="Futura Medium" panose="020B0602020204020303" pitchFamily="34" charset="-79"/>
+              </a:rPr>
+              <a:t>Bridge tools</a:t>
+            </a:r>
+          </a:p>
+        </p:txBody>
+      </p:sp>
+      <p:pic>
+        <p:nvPicPr>
+          <p:cNvPr id="51" name="Graphic 50" descr="Bridge scene with solid fill">
+            <a:extLst>
+              <a:ext uri="{FF2B5EF4-FFF2-40B4-BE49-F238E27FC236}">
+                <a16:creationId xmlns:a16="http://schemas.microsoft.com/office/drawing/2014/main" id="{66C76B15-9568-BA4A-8DC8-099ED45803A9}"/>
+              </a:ext>
+            </a:extLst>
+          </p:cNvPr>
+          <p:cNvPicPr>
+            <a:picLocks noChangeAspect="1"/>
+          </p:cNvPicPr>
+          <p:nvPr/>
+        </p:nvPicPr>
+        <p:blipFill>
+          <a:blip r:embed="rId20">
+            <a:extLst>
+              <a:ext uri="{96DAC541-7B7A-43D3-8B79-37D633B846F1}">
+                <asvg:svgBlip xmlns:asvg="http://schemas.microsoft.com/office/drawing/2016/SVG/main" r:embed="rId21"/>
+              </a:ext>
+            </a:extLst>
+          </a:blip>
+          <a:stretch>
+            <a:fillRect/>
+          </a:stretch>
+        </p:blipFill>
+        <p:spPr>
+          <a:xfrm>
+            <a:off x="2695636" y="3796323"/>
+            <a:ext cx="270000" cy="270000"/>
+          </a:xfrm>
+          <a:prstGeom prst="rect">
+            <a:avLst/>
+          </a:prstGeom>
+        </p:spPr>
+      </p:pic>
+      <p:cxnSp>
+        <p:nvCxnSpPr>
+          <p:cNvPr id="70" name="Straight Connector 69">
+            <a:extLst>
+              <a:ext uri="{FF2B5EF4-FFF2-40B4-BE49-F238E27FC236}">
+                <a16:creationId xmlns:a16="http://schemas.microsoft.com/office/drawing/2014/main" id="{622A0BD9-C157-ED45-B80D-7B65D397947E}"/>
+              </a:ext>
+            </a:extLst>
+          </p:cNvPr>
+          <p:cNvCxnSpPr>
+            <a:cxnSpLocks/>
+            <a:stCxn id="3" idx="2"/>
+            <a:endCxn id="9" idx="0"/>
+          </p:cNvCxnSpPr>
+          <p:nvPr/>
+        </p:nvCxnSpPr>
+        <p:spPr>
+          <a:xfrm>
+            <a:off x="875376" y="2923819"/>
+            <a:ext cx="0" cy="115473"/>
+          </a:xfrm>
+          <a:prstGeom prst="line">
+            <a:avLst/>
+          </a:prstGeom>
+          <a:ln w="38100">
+            <a:solidFill>
+              <a:schemeClr val="tx1"/>
+            </a:solidFill>
+          </a:ln>
+        </p:spPr>
+        <p:style>
+          <a:lnRef idx="1">
+            <a:schemeClr val="accent1"/>
+          </a:lnRef>
+          <a:fillRef idx="0">
+            <a:schemeClr val="accent1"/>
+          </a:fillRef>
+          <a:effectRef idx="0">
+            <a:schemeClr val="accent1"/>
+          </a:effectRef>
+          <a:fontRef idx="minor">
+            <a:schemeClr val="tx1"/>
+          </a:fontRef>
+        </p:style>
+      </p:cxnSp>
+      <p:cxnSp>
+        <p:nvCxnSpPr>
+          <p:cNvPr id="73" name="Straight Connector 72">
+            <a:extLst>
+              <a:ext uri="{FF2B5EF4-FFF2-40B4-BE49-F238E27FC236}">
+                <a16:creationId xmlns:a16="http://schemas.microsoft.com/office/drawing/2014/main" id="{0FF2BA89-D6ED-EC49-8032-2097B17AE7DC}"/>
+              </a:ext>
+            </a:extLst>
+          </p:cNvPr>
+          <p:cNvCxnSpPr>
+            <a:cxnSpLocks/>
+            <a:stCxn id="8" idx="2"/>
+            <a:endCxn id="11" idx="0"/>
+          </p:cNvCxnSpPr>
+          <p:nvPr/>
+        </p:nvCxnSpPr>
+        <p:spPr>
+          <a:xfrm flipH="1">
+            <a:off x="875376" y="3716401"/>
+            <a:ext cx="2404" cy="107895"/>
+          </a:xfrm>
+          <a:prstGeom prst="line">
+            <a:avLst/>
+          </a:prstGeom>
+          <a:ln w="38100">
+            <a:solidFill>
+              <a:schemeClr val="tx1"/>
+            </a:solidFill>
+          </a:ln>
+        </p:spPr>
+        <p:style>
+          <a:lnRef idx="1">
+            <a:schemeClr val="accent1"/>
+          </a:lnRef>
+          <a:fillRef idx="0">
+            <a:schemeClr val="accent1"/>
+          </a:fillRef>
+          <a:effectRef idx="0">
+            <a:schemeClr val="accent1"/>
+          </a:effectRef>
+          <a:fontRef idx="minor">
+            <a:schemeClr val="tx1"/>
+          </a:fontRef>
+        </p:style>
+      </p:cxnSp>
+      <p:cxnSp>
+        <p:nvCxnSpPr>
+          <p:cNvPr id="76" name="Straight Connector 75">
+            <a:extLst>
+              <a:ext uri="{FF2B5EF4-FFF2-40B4-BE49-F238E27FC236}">
+                <a16:creationId xmlns:a16="http://schemas.microsoft.com/office/drawing/2014/main" id="{1833663A-6ABB-EC42-9873-EC7D299ADB2E}"/>
+              </a:ext>
+            </a:extLst>
+          </p:cNvPr>
+          <p:cNvCxnSpPr>
+            <a:cxnSpLocks/>
+            <a:stCxn id="43" idx="0"/>
+            <a:endCxn id="19" idx="2"/>
+          </p:cNvCxnSpPr>
+          <p:nvPr/>
+        </p:nvCxnSpPr>
+        <p:spPr>
+          <a:xfrm flipV="1">
+            <a:off x="7752252" y="2086428"/>
+            <a:ext cx="0" cy="161742"/>
+          </a:xfrm>
+          <a:prstGeom prst="line">
+            <a:avLst/>
+          </a:prstGeom>
+          <a:ln w="38100">
+            <a:solidFill>
+              <a:schemeClr val="tx1"/>
+            </a:solidFill>
+          </a:ln>
+        </p:spPr>
+        <p:style>
+          <a:lnRef idx="1">
+            <a:schemeClr val="accent1"/>
+          </a:lnRef>
+          <a:fillRef idx="0">
+            <a:schemeClr val="accent1"/>
+          </a:fillRef>
+          <a:effectRef idx="0">
+            <a:schemeClr val="accent1"/>
+          </a:effectRef>
+          <a:fontRef idx="minor">
+            <a:schemeClr val="tx1"/>
+          </a:fontRef>
+        </p:style>
+      </p:cxnSp>
+      <p:cxnSp>
+        <p:nvCxnSpPr>
+          <p:cNvPr id="79" name="Straight Connector 78">
+            <a:extLst>
+              <a:ext uri="{FF2B5EF4-FFF2-40B4-BE49-F238E27FC236}">
+                <a16:creationId xmlns:a16="http://schemas.microsoft.com/office/drawing/2014/main" id="{522BECFC-A959-CA44-9856-CE17AC23F234}"/>
+              </a:ext>
+            </a:extLst>
+          </p:cNvPr>
+          <p:cNvCxnSpPr>
+            <a:cxnSpLocks/>
+            <a:stCxn id="23" idx="2"/>
+            <a:endCxn id="50" idx="0"/>
+          </p:cNvCxnSpPr>
+          <p:nvPr/>
+        </p:nvCxnSpPr>
+        <p:spPr>
+          <a:xfrm flipH="1">
+            <a:off x="2373507" y="3716349"/>
+            <a:ext cx="3199" cy="107947"/>
+          </a:xfrm>
+          <a:prstGeom prst="line">
+            <a:avLst/>
+          </a:prstGeom>
+          <a:ln w="38100">
+            <a:solidFill>
+              <a:schemeClr val="tx1"/>
+            </a:solidFill>
+          </a:ln>
+        </p:spPr>
+        <p:style>
+          <a:lnRef idx="1">
+            <a:schemeClr val="accent1"/>
+          </a:lnRef>
+          <a:fillRef idx="0">
+            <a:schemeClr val="accent1"/>
+          </a:fillRef>
+          <a:effectRef idx="0">
+            <a:schemeClr val="accent1"/>
+          </a:effectRef>
+          <a:fontRef idx="minor">
+            <a:schemeClr val="tx1"/>
+          </a:fontRef>
+        </p:style>
+      </p:cxnSp>
+      <p:cxnSp>
+        <p:nvCxnSpPr>
+          <p:cNvPr id="82" name="Straight Connector 81">
+            <a:extLst>
+              <a:ext uri="{FF2B5EF4-FFF2-40B4-BE49-F238E27FC236}">
+                <a16:creationId xmlns:a16="http://schemas.microsoft.com/office/drawing/2014/main" id="{968738E2-6275-2848-8199-839AE2CBAA0F}"/>
+              </a:ext>
+            </a:extLst>
+          </p:cNvPr>
+          <p:cNvCxnSpPr>
+            <a:cxnSpLocks/>
+            <a:stCxn id="24" idx="0"/>
+            <a:endCxn id="21" idx="2"/>
+          </p:cNvCxnSpPr>
+          <p:nvPr/>
+        </p:nvCxnSpPr>
+        <p:spPr>
+          <a:xfrm flipV="1">
+            <a:off x="2376706" y="2925711"/>
+            <a:ext cx="0" cy="111634"/>
+          </a:xfrm>
+          <a:prstGeom prst="line">
+            <a:avLst/>
+          </a:prstGeom>
+          <a:ln w="38100">
+            <a:solidFill>
+              <a:schemeClr val="tx1"/>
+            </a:solidFill>
+          </a:ln>
+        </p:spPr>
+        <p:style>
+          <a:lnRef idx="1">
+            <a:schemeClr val="accent1"/>
+          </a:lnRef>
+          <a:fillRef idx="0">
+            <a:schemeClr val="accent1"/>
+          </a:fillRef>
+          <a:effectRef idx="0">
+            <a:schemeClr val="accent1"/>
+          </a:effectRef>
+          <a:fontRef idx="minor">
+            <a:schemeClr val="tx1"/>
+          </a:fontRef>
+        </p:style>
+      </p:cxnSp>
+      <p:cxnSp>
+        <p:nvCxnSpPr>
+          <p:cNvPr id="85" name="Straight Connector 84">
+            <a:extLst>
+              <a:ext uri="{FF2B5EF4-FFF2-40B4-BE49-F238E27FC236}">
+                <a16:creationId xmlns:a16="http://schemas.microsoft.com/office/drawing/2014/main" id="{49BB1740-2772-8541-B81E-D2C452047B90}"/>
+              </a:ext>
+            </a:extLst>
+          </p:cNvPr>
+          <p:cNvCxnSpPr>
+            <a:cxnSpLocks/>
+            <a:stCxn id="22" idx="0"/>
+            <a:endCxn id="5" idx="2"/>
+          </p:cNvCxnSpPr>
+          <p:nvPr/>
+        </p:nvCxnSpPr>
+        <p:spPr>
+          <a:xfrm flipV="1">
+            <a:off x="2382257" y="2086428"/>
+            <a:ext cx="4791" cy="160282"/>
+          </a:xfrm>
+          <a:prstGeom prst="line">
+            <a:avLst/>
+          </a:prstGeom>
+          <a:ln w="38100">
+            <a:solidFill>
+              <a:schemeClr val="tx1"/>
+            </a:solidFill>
+          </a:ln>
+        </p:spPr>
+        <p:style>
+          <a:lnRef idx="1">
+            <a:schemeClr val="accent1"/>
+          </a:lnRef>
+          <a:fillRef idx="0">
+            <a:schemeClr val="accent1"/>
+          </a:fillRef>
+          <a:effectRef idx="0">
+            <a:schemeClr val="accent1"/>
+          </a:effectRef>
+          <a:fontRef idx="minor">
+            <a:schemeClr val="tx1"/>
+          </a:fontRef>
+        </p:style>
+      </p:cxnSp>
+      <p:cxnSp>
+        <p:nvCxnSpPr>
+          <p:cNvPr id="88" name="Straight Connector 87">
+            <a:extLst>
+              <a:ext uri="{FF2B5EF4-FFF2-40B4-BE49-F238E27FC236}">
+                <a16:creationId xmlns:a16="http://schemas.microsoft.com/office/drawing/2014/main" id="{2F7FEF7F-A1B5-CF4D-A8B6-0A478EAB419D}"/>
+              </a:ext>
+            </a:extLst>
+          </p:cNvPr>
+          <p:cNvCxnSpPr>
+            <a:cxnSpLocks/>
+            <a:stCxn id="31" idx="0"/>
+            <a:endCxn id="18" idx="2"/>
+          </p:cNvCxnSpPr>
+          <p:nvPr/>
+        </p:nvCxnSpPr>
+        <p:spPr>
+          <a:xfrm flipV="1">
+            <a:off x="4152038" y="2086674"/>
+            <a:ext cx="2018" cy="160036"/>
+          </a:xfrm>
+          <a:prstGeom prst="line">
+            <a:avLst/>
+          </a:prstGeom>
+          <a:ln w="38100">
+            <a:solidFill>
+              <a:schemeClr val="tx1"/>
+            </a:solidFill>
+          </a:ln>
+        </p:spPr>
+        <p:style>
+          <a:lnRef idx="1">
+            <a:schemeClr val="accent1"/>
+          </a:lnRef>
+          <a:fillRef idx="0">
+            <a:schemeClr val="accent1"/>
+          </a:fillRef>
+          <a:effectRef idx="0">
+            <a:schemeClr val="accent1"/>
+          </a:effectRef>
+          <a:fontRef idx="minor">
+            <a:schemeClr val="tx1"/>
+          </a:fontRef>
+        </p:style>
+      </p:cxnSp>
+      <p:cxnSp>
+        <p:nvCxnSpPr>
+          <p:cNvPr id="89" name="Straight Connector 88">
+            <a:extLst>
+              <a:ext uri="{FF2B5EF4-FFF2-40B4-BE49-F238E27FC236}">
+                <a16:creationId xmlns:a16="http://schemas.microsoft.com/office/drawing/2014/main" id="{39552BAC-CAA4-8F48-847C-25DE54A42A1B}"/>
+              </a:ext>
+            </a:extLst>
+          </p:cNvPr>
+          <p:cNvCxnSpPr>
+            <a:cxnSpLocks/>
+            <a:stCxn id="36" idx="0"/>
+            <a:endCxn id="30" idx="2"/>
+          </p:cNvCxnSpPr>
+          <p:nvPr/>
+        </p:nvCxnSpPr>
+        <p:spPr>
+          <a:xfrm flipH="1" flipV="1">
+            <a:off x="4150411" y="2924771"/>
+            <a:ext cx="6047" cy="112574"/>
+          </a:xfrm>
+          <a:prstGeom prst="line">
+            <a:avLst/>
+          </a:prstGeom>
+          <a:ln w="38100">
+            <a:solidFill>
+              <a:schemeClr val="tx1"/>
+            </a:solidFill>
+          </a:ln>
+        </p:spPr>
+        <p:style>
+          <a:lnRef idx="1">
+            <a:schemeClr val="accent1"/>
+          </a:lnRef>
+          <a:fillRef idx="0">
+            <a:schemeClr val="accent1"/>
+          </a:fillRef>
+          <a:effectRef idx="0">
+            <a:schemeClr val="accent1"/>
+          </a:effectRef>
+          <a:fontRef idx="minor">
+            <a:schemeClr val="tx1"/>
+          </a:fontRef>
+        </p:style>
+      </p:cxnSp>
+      <p:cxnSp>
+        <p:nvCxnSpPr>
+          <p:cNvPr id="94" name="Straight Connector 93">
+            <a:extLst>
+              <a:ext uri="{FF2B5EF4-FFF2-40B4-BE49-F238E27FC236}">
+                <a16:creationId xmlns:a16="http://schemas.microsoft.com/office/drawing/2014/main" id="{020E0DD5-11E5-6946-9D23-EA6675E2FF2D}"/>
+              </a:ext>
+            </a:extLst>
+          </p:cNvPr>
+          <p:cNvCxnSpPr>
+            <a:cxnSpLocks/>
+            <a:stCxn id="39" idx="0"/>
+            <a:endCxn id="6" idx="2"/>
+          </p:cNvCxnSpPr>
+          <p:nvPr/>
+        </p:nvCxnSpPr>
+        <p:spPr>
+          <a:xfrm flipV="1">
+            <a:off x="6078643" y="2086428"/>
+            <a:ext cx="4422" cy="154041"/>
+          </a:xfrm>
+          <a:prstGeom prst="line">
+            <a:avLst/>
+          </a:prstGeom>
+          <a:ln w="38100">
+            <a:solidFill>
+              <a:schemeClr val="tx1"/>
+            </a:solidFill>
+          </a:ln>
+        </p:spPr>
+        <p:style>
+          <a:lnRef idx="1">
+            <a:schemeClr val="accent1"/>
+          </a:lnRef>
+          <a:fillRef idx="0">
+            <a:schemeClr val="accent1"/>
+          </a:fillRef>
+          <a:effectRef idx="0">
+            <a:schemeClr val="accent1"/>
+          </a:effectRef>
+          <a:fontRef idx="minor">
+            <a:schemeClr val="tx1"/>
+          </a:fontRef>
+        </p:style>
+      </p:cxnSp>
+    </p:spTree>
+    <p:extLst>
+      <p:ext uri="{BB962C8B-B14F-4D97-AF65-F5344CB8AC3E}">
+        <p14:creationId xmlns:p14="http://schemas.microsoft.com/office/powerpoint/2010/main" val="2448952100"/>
+      </p:ext>
+    </p:extLst>
+  </p:cSld>
+  <p:clrMapOvr>
+    <a:masterClrMapping/>
+  </p:clrMapOvr>
+</p:sld>
+</file>
+
 <file path=ppt/theme/theme1.xml><?xml version="1.0" encoding="utf-8"?>
 <a:theme xmlns:a="http://schemas.openxmlformats.org/drawingml/2006/main" name="Office Theme">
   <a:themeElements>

</xml_diff>